<commit_message>
Updating with link to my recording
</commit_message>
<xml_diff>
--- a/American Brewery Case Study - Julia Layne.pptx
+++ b/American Brewery Case Study - Julia Layne.pptx
@@ -20,6 +20,7 @@
     <p:sldId id="265" r:id="rId17"/>
     <p:sldId id="266" r:id="rId18"/>
     <p:sldId id="267" r:id="rId19"/>
+    <p:sldId id="268" r:id="rId20"/>
   </p:sldIdLst>
   <p:sldSz cx="9144000" cy="6858000"/>
   <p:notesSz cx="6858000" cy="9144000"/>
@@ -347,7 +348,7 @@
       </p:grpSpPr>
       <p:sp>
         <p:nvSpPr>
-          <p:cNvPr id="91" name="Shape 91"/>
+          <p:cNvPr id="92" name="Shape 92"/>
           <p:cNvSpPr/>
           <p:nvPr>
             <p:ph type="sldImg"/>
@@ -372,7 +373,7 @@
       </p:sp>
       <p:sp>
         <p:nvSpPr>
-          <p:cNvPr id="92" name="Shape 92"/>
+          <p:cNvPr id="93" name="Shape 93"/>
           <p:cNvSpPr/>
           <p:nvPr>
             <p:ph type="body" sz="quarter" idx="1"/>
@@ -494,7 +495,7 @@
       </p:grpSpPr>
       <p:sp>
         <p:nvSpPr>
-          <p:cNvPr id="105" name="Shape 105"/>
+          <p:cNvPr id="106" name="Shape 106"/>
           <p:cNvSpPr/>
           <p:nvPr>
             <p:ph type="sldImg"/>
@@ -515,7 +516,7 @@
       </p:sp>
       <p:sp>
         <p:nvSpPr>
-          <p:cNvPr id="106" name="Shape 106"/>
+          <p:cNvPr id="107" name="Shape 107"/>
           <p:cNvSpPr/>
           <p:nvPr>
             <p:ph type="body" sz="quarter" idx="1"/>
@@ -564,7 +565,7 @@
       </p:grpSpPr>
       <p:sp>
         <p:nvSpPr>
-          <p:cNvPr id="114" name="Shape 114"/>
+          <p:cNvPr id="115" name="Shape 115"/>
           <p:cNvSpPr/>
           <p:nvPr>
             <p:ph type="sldImg"/>
@@ -585,7 +586,7 @@
       </p:sp>
       <p:sp>
         <p:nvSpPr>
-          <p:cNvPr id="115" name="Shape 115"/>
+          <p:cNvPr id="116" name="Shape 116"/>
           <p:cNvSpPr/>
           <p:nvPr>
             <p:ph type="body" sz="quarter" idx="1"/>
@@ -652,7 +653,7 @@
       </p:grpSpPr>
       <p:sp>
         <p:nvSpPr>
-          <p:cNvPr id="133" name="Shape 133"/>
+          <p:cNvPr id="134" name="Shape 134"/>
           <p:cNvSpPr/>
           <p:nvPr>
             <p:ph type="sldImg"/>
@@ -673,7 +674,7 @@
       </p:sp>
       <p:sp>
         <p:nvSpPr>
-          <p:cNvPr id="134" name="Shape 134"/>
+          <p:cNvPr id="135" name="Shape 135"/>
           <p:cNvSpPr/>
           <p:nvPr>
             <p:ph type="body" sz="quarter" idx="1"/>
@@ -728,7 +729,7 @@
       </p:grpSpPr>
       <p:sp>
         <p:nvSpPr>
-          <p:cNvPr id="143" name="Shape 143"/>
+          <p:cNvPr id="144" name="Shape 144"/>
           <p:cNvSpPr/>
           <p:nvPr>
             <p:ph type="sldImg"/>
@@ -749,7 +750,7 @@
       </p:sp>
       <p:sp>
         <p:nvSpPr>
-          <p:cNvPr id="144" name="Shape 144"/>
+          <p:cNvPr id="145" name="Shape 145"/>
           <p:cNvSpPr/>
           <p:nvPr>
             <p:ph type="body" sz="quarter" idx="1"/>
@@ -810,7 +811,7 @@
       </p:grpSpPr>
       <p:sp>
         <p:nvSpPr>
-          <p:cNvPr id="151" name="Shape 151"/>
+          <p:cNvPr id="152" name="Shape 152"/>
           <p:cNvSpPr/>
           <p:nvPr>
             <p:ph type="sldImg"/>
@@ -831,7 +832,7 @@
       </p:sp>
       <p:sp>
         <p:nvSpPr>
-          <p:cNvPr id="152" name="Shape 152"/>
+          <p:cNvPr id="153" name="Shape 153"/>
           <p:cNvSpPr/>
           <p:nvPr>
             <p:ph type="body" sz="quarter" idx="1"/>
@@ -1820,9 +1821,38 @@
           </a:p>
         </p:txBody>
       </p:sp>
+      <p:pic>
+        <p:nvPicPr>
+          <p:cNvPr id="58" name="Picture 1" descr="Picture 1"/>
+          <p:cNvPicPr>
+            <a:picLocks noChangeAspect="1"/>
+          </p:cNvPicPr>
+          <p:nvPr/>
+        </p:nvPicPr>
+        <p:blipFill>
+          <a:blip r:embed="rId2">
+            <a:extLst/>
+          </a:blip>
+          <a:stretch>
+            <a:fillRect/>
+          </a:stretch>
+        </p:blipFill>
+        <p:spPr>
+          <a:xfrm>
+            <a:off x="7543800" y="6235177"/>
+            <a:ext cx="1600200" cy="622824"/>
+          </a:xfrm>
+          <a:prstGeom prst="rect">
+            <a:avLst/>
+          </a:prstGeom>
+          <a:ln w="12700">
+            <a:miter lim="400000"/>
+          </a:ln>
+        </p:spPr>
+      </p:pic>
       <p:sp>
         <p:nvSpPr>
-          <p:cNvPr id="58" name="Slide Number"/>
+          <p:cNvPr id="59" name="Slide Number"/>
           <p:cNvSpPr txBox="1"/>
           <p:nvPr>
             <p:ph type="sldNum" sz="quarter" idx="2"/>
@@ -1877,7 +1907,7 @@
       </p:grpSpPr>
       <p:sp>
         <p:nvSpPr>
-          <p:cNvPr id="65" name="Slide Number"/>
+          <p:cNvPr id="66" name="Slide Number"/>
           <p:cNvSpPr txBox="1"/>
           <p:nvPr>
             <p:ph type="sldNum" sz="quarter" idx="2"/>
@@ -1925,7 +1955,7 @@
       </p:grpSpPr>
       <p:sp>
         <p:nvSpPr>
-          <p:cNvPr id="72" name="Title Text"/>
+          <p:cNvPr id="73" name="Title Text"/>
           <p:cNvSpPr txBox="1"/>
           <p:nvPr>
             <p:ph type="title"/>
@@ -1962,7 +1992,7 @@
       </p:sp>
       <p:sp>
         <p:nvSpPr>
-          <p:cNvPr id="73" name="Body Level One…"/>
+          <p:cNvPr id="74" name="Body Level One…"/>
           <p:cNvSpPr txBox="1"/>
           <p:nvPr>
             <p:ph type="body" idx="1"/>
@@ -2014,7 +2044,7 @@
       </p:sp>
       <p:sp>
         <p:nvSpPr>
-          <p:cNvPr id="74" name="Text Placeholder 3"/>
+          <p:cNvPr id="75" name="Text Placeholder 3"/>
           <p:cNvSpPr/>
           <p:nvPr>
             <p:ph type="body" sz="half" idx="13"/>
@@ -2039,7 +2069,7 @@
       </p:sp>
       <p:sp>
         <p:nvSpPr>
-          <p:cNvPr id="75" name="Slide Number"/>
+          <p:cNvPr id="76" name="Slide Number"/>
           <p:cNvSpPr txBox="1"/>
           <p:nvPr>
             <p:ph type="sldNum" sz="quarter" idx="2"/>
@@ -2087,7 +2117,7 @@
       </p:grpSpPr>
       <p:sp>
         <p:nvSpPr>
-          <p:cNvPr id="82" name="Title Text"/>
+          <p:cNvPr id="83" name="Title Text"/>
           <p:cNvSpPr txBox="1"/>
           <p:nvPr>
             <p:ph type="title"/>
@@ -2124,7 +2154,7 @@
       </p:sp>
       <p:sp>
         <p:nvSpPr>
-          <p:cNvPr id="83" name="Picture Placeholder 2"/>
+          <p:cNvPr id="84" name="Picture Placeholder 2"/>
           <p:cNvSpPr/>
           <p:nvPr>
             <p:ph type="pic" sz="half" idx="13"/>
@@ -2151,7 +2181,7 @@
       </p:sp>
       <p:sp>
         <p:nvSpPr>
-          <p:cNvPr id="84" name="Body Level One…"/>
+          <p:cNvPr id="85" name="Body Level One…"/>
           <p:cNvSpPr txBox="1"/>
           <p:nvPr>
             <p:ph type="body" sz="quarter" idx="1"/>
@@ -2249,7 +2279,7 @@
       </p:sp>
       <p:sp>
         <p:nvSpPr>
-          <p:cNvPr id="85" name="Slide Number"/>
+          <p:cNvPr id="86" name="Slide Number"/>
           <p:cNvSpPr txBox="1"/>
           <p:nvPr>
             <p:ph type="sldNum" sz="quarter" idx="2"/>
@@ -3217,7 +3247,7 @@
       </p:grpSpPr>
       <p:sp>
         <p:nvSpPr>
-          <p:cNvPr id="94" name="Breweries in the US"/>
+          <p:cNvPr id="95" name="Breweries in the US"/>
           <p:cNvSpPr txBox="1"/>
           <p:nvPr>
             <p:ph type="ctrTitle"/>
@@ -3241,7 +3271,7 @@
       </p:sp>
       <p:sp>
         <p:nvSpPr>
-          <p:cNvPr id="95" name="A review of Alcohol by Volume and International Bitterness Scale across Breweries in the United States"/>
+          <p:cNvPr id="96" name="A review of Alcohol by Volume and International Bitterness Scale across Breweries in the United States"/>
           <p:cNvSpPr txBox="1"/>
           <p:nvPr>
             <p:ph type="subTitle" sz="quarter" idx="1"/>
@@ -3269,7 +3299,7 @@
       </p:sp>
       <p:sp>
         <p:nvSpPr>
-          <p:cNvPr id="96" name="Line"/>
+          <p:cNvPr id="97" name="Line"/>
           <p:cNvSpPr/>
           <p:nvPr/>
         </p:nvSpPr>
@@ -3304,7 +3334,7 @@
       </p:sp>
       <p:sp>
         <p:nvSpPr>
-          <p:cNvPr id="97" name="Analysis by Josh Eysenbach and Julia Layne"/>
+          <p:cNvPr id="98" name="Analysis by Josh Eysenbach and Julia Layne"/>
           <p:cNvSpPr txBox="1"/>
           <p:nvPr/>
         </p:nvSpPr>
@@ -3351,7 +3381,7 @@
       </p:sp>
       <p:pic>
         <p:nvPicPr>
-          <p:cNvPr id="98" name="Picture 1" descr="Picture 1"/>
+          <p:cNvPr id="99" name="Picture 1" descr="Picture 1"/>
           <p:cNvPicPr>
             <a:picLocks noChangeAspect="1"/>
           </p:cNvPicPr>
@@ -3413,7 +3443,7 @@
       </p:grpSpPr>
       <p:sp>
         <p:nvSpPr>
-          <p:cNvPr id="163" name="ABV and IBU Distinct in Pale Ale Styles"/>
+          <p:cNvPr id="164" name="ABV and IBU Distinct in Pale Ale Styles"/>
           <p:cNvSpPr txBox="1"/>
           <p:nvPr>
             <p:ph type="title"/>
@@ -3441,7 +3471,7 @@
       </p:sp>
       <p:pic>
         <p:nvPicPr>
-          <p:cNvPr id="164" name="Screen Shot 2020-03-07 at 5.01.51 PM.png" descr="Screen Shot 2020-03-07 at 5.01.51 PM.png"/>
+          <p:cNvPr id="165" name="Screen Shot 2020-03-07 at 5.01.51 PM.png" descr="Screen Shot 2020-03-07 at 5.01.51 PM.png"/>
           <p:cNvPicPr>
             <a:picLocks noChangeAspect="1"/>
           </p:cNvPicPr>
@@ -3470,7 +3500,7 @@
       </p:pic>
       <p:pic>
         <p:nvPicPr>
-          <p:cNvPr id="165" name="Screen Shot 2020-03-07 at 5.11.51 PM.png" descr="Screen Shot 2020-03-07 at 5.11.51 PM.png"/>
+          <p:cNvPr id="166" name="Screen Shot 2020-03-07 at 5.11.51 PM.png" descr="Screen Shot 2020-03-07 at 5.11.51 PM.png"/>
           <p:cNvPicPr>
             <a:picLocks noChangeAspect="1"/>
           </p:cNvPicPr>
@@ -3499,7 +3529,7 @@
       </p:pic>
       <p:pic>
         <p:nvPicPr>
-          <p:cNvPr id="166" name="Screen Shot 2020-03-07 at 5.12.38 PM.png" descr="Screen Shot 2020-03-07 at 5.12.38 PM.png"/>
+          <p:cNvPr id="167" name="Screen Shot 2020-03-07 at 5.12.38 PM.png" descr="Screen Shot 2020-03-07 at 5.12.38 PM.png"/>
           <p:cNvPicPr>
             <a:picLocks noChangeAspect="1"/>
           </p:cNvPicPr>
@@ -3528,7 +3558,7 @@
       </p:pic>
       <p:sp>
         <p:nvSpPr>
-          <p:cNvPr id="167" name="Visually on we see what appear to be distinct ranges between Pale Ale Styles…"/>
+          <p:cNvPr id="168" name="Visually on we see what appear to be distinct ranges between Pale Ale Styles…"/>
           <p:cNvSpPr txBox="1"/>
           <p:nvPr/>
         </p:nvSpPr>
@@ -3625,7 +3655,7 @@
       </p:grpSpPr>
       <p:sp>
         <p:nvSpPr>
-          <p:cNvPr id="169" name="BUD IPA"/>
+          <p:cNvPr id="170" name="BUDWEISER’S IPA"/>
           <p:cNvSpPr txBox="1"/>
           <p:nvPr>
             <p:ph type="title"/>
@@ -3642,21 +3672,21 @@
           <a:p>
             <a:pPr/>
             <a:r>
-              <a:t>BUD IPA</a:t>
+              <a:t>BUDWEISER’S IPA</a:t>
             </a:r>
           </a:p>
         </p:txBody>
       </p:sp>
       <p:sp>
         <p:nvSpPr>
-          <p:cNvPr id="170" name="Based on our comparisons between styles there are distinct ranges for an American IPA on both IBU and ABV. We suggest the IBU and ABV be within the 50% Middle distribution of the American IPA style…"/>
+          <p:cNvPr id="171" name="Based on our comparisons between styles there are distinct ranges for an American IPA on both IBU and ABV. We suggest the IBU and ABV be within the 50% Middle distribution of the American IPA style…"/>
           <p:cNvSpPr txBox="1"/>
           <p:nvPr/>
         </p:nvSpPr>
         <p:spPr>
           <a:xfrm>
             <a:off x="453487" y="1281257"/>
-            <a:ext cx="4435360" cy="4130386"/>
+            <a:ext cx="8237026" cy="2377786"/>
           </a:xfrm>
           <a:prstGeom prst="rect">
             <a:avLst/>
@@ -3706,12 +3736,12 @@
       </p:sp>
       <p:graphicFrame>
         <p:nvGraphicFramePr>
-          <p:cNvPr id="171" name="Table"/>
+          <p:cNvPr id="172" name="Table"/>
           <p:cNvGraphicFramePr/>
           <p:nvPr/>
         </p:nvGraphicFramePr>
         <p:xfrm>
-          <a:off x="5045027" y="4462041"/>
+          <a:off x="4562427" y="4042941"/>
           <a:ext cx="6416676" cy="3172461"/>
         </p:xfrm>
         <a:graphic xmlns:a="http://schemas.openxmlformats.org/drawingml/2006/main">
@@ -4023,14 +4053,14 @@
       </p:graphicFrame>
       <p:sp>
         <p:nvSpPr>
-          <p:cNvPr id="172" name="Middle 50% distributions and suggested ranges for IBU ABV"/>
+          <p:cNvPr id="173" name="Middle 50% distributions and suggested ranges for IBU ABV"/>
           <p:cNvSpPr txBox="1"/>
           <p:nvPr/>
         </p:nvSpPr>
         <p:spPr>
           <a:xfrm>
-            <a:off x="5044555" y="6024881"/>
-            <a:ext cx="3912199" cy="625186"/>
+            <a:off x="4561955" y="5523165"/>
+            <a:ext cx="3912199" cy="625187"/>
           </a:xfrm>
           <a:prstGeom prst="rect">
             <a:avLst/>
@@ -4059,7 +4089,7 @@
       </p:sp>
       <p:pic>
         <p:nvPicPr>
-          <p:cNvPr id="173" name="Bud IPA logo.JPG" descr="Bud IPA logo.JPG"/>
+          <p:cNvPr id="174" name="Bud IPA logo.JPG" descr="Bud IPA logo.JPG"/>
           <p:cNvPicPr>
             <a:picLocks noChangeAspect="1"/>
           </p:cNvPicPr>
@@ -4075,8 +4105,8 @@
         </p:blipFill>
         <p:spPr>
           <a:xfrm>
-            <a:off x="5378008" y="1366844"/>
-            <a:ext cx="3245292" cy="2805106"/>
+            <a:off x="564708" y="3753012"/>
+            <a:ext cx="3245293" cy="2805107"/>
           </a:xfrm>
           <a:prstGeom prst="rect">
             <a:avLst/>
@@ -4098,6 +4128,13 @@
 <file path=ppt/slides/slide12.xml><?xml version="1.0" encoding="utf-8"?>
 <p:sld xmlns:a="http://schemas.openxmlformats.org/drawingml/2006/main" xmlns:r="http://schemas.openxmlformats.org/officeDocument/2006/relationships" xmlns:p="http://schemas.openxmlformats.org/presentationml/2006/main" xmlns:m="http://schemas.openxmlformats.org/officeDocument/2006/math" xmlns:a14="http://schemas.microsoft.com/office/drawing/2010/main" showMasterSp="1" showMasterPhAnim="1">
   <p:cSld>
+    <p:bg>
+      <p:bgPr>
+        <a:solidFill>
+          <a:srgbClr val="FFFFFF"/>
+        </a:solidFill>
+      </p:bgPr>
+    </p:bg>
     <p:spTree>
       <p:nvGrpSpPr>
         <p:cNvPr id="1" name=""/>
@@ -4114,10 +4151,121 @@
       </p:grpSpPr>
       <p:sp>
         <p:nvSpPr>
-          <p:cNvPr id="175" name="Title"/>
+          <p:cNvPr id="176" name="&quot;It is my aim to win the American people over ... to make them all lovers of beer.”…"/>
+          <p:cNvSpPr txBox="1"/>
+          <p:nvPr/>
+        </p:nvSpPr>
+        <p:spPr>
+          <a:xfrm>
+            <a:off x="1330649" y="3329205"/>
+            <a:ext cx="6482702" cy="2615316"/>
+          </a:xfrm>
+          <a:prstGeom prst="rect">
+            <a:avLst/>
+          </a:prstGeom>
+          <a:ln w="12700">
+            <a:miter lim="400000"/>
+          </a:ln>
+          <a:extLst>
+            <a:ext uri="{C572A759-6A51-4108-AA02-DFA0A04FC94B}">
+              <ma14:wrappingTextBoxFlag xmlns:ma14="http://schemas.microsoft.com/office/mac/drawingml/2011/main" val="1"/>
+            </a:ext>
+          </a:extLst>
+        </p:spPr>
+        <p:txBody>
+          <a:bodyPr lIns="45718" tIns="45718" rIns="45718" bIns="45718">
+            <a:spAutoFit/>
+          </a:bodyPr>
+          <a:lstStyle/>
+          <a:p>
+            <a:pPr algn="ctr">
+              <a:defRPr i="1" sz="4200">
+                <a:latin typeface="Calibri-Italic"/>
+                <a:ea typeface="Calibri-Italic"/>
+                <a:cs typeface="Calibri-Italic"/>
+                <a:sym typeface="Calibri-Italic"/>
+              </a:defRPr>
+            </a:pPr>
+            <a:r>
+              <a:t>"It is my aim to win the American people over ... to make them all lovers of beer.” </a:t>
+            </a:r>
+          </a:p>
+          <a:p>
+            <a:pPr algn="ctr">
+              <a:defRPr i="1" sz="4200">
+                <a:latin typeface="Calibri-Italic"/>
+                <a:ea typeface="Calibri-Italic"/>
+                <a:cs typeface="Calibri-Italic"/>
+                <a:sym typeface="Calibri-Italic"/>
+              </a:defRPr>
+            </a:pPr>
+            <a:r>
+              <a:t>- Adolphus Busch (1905)</a:t>
+            </a:r>
+          </a:p>
+        </p:txBody>
+      </p:sp>
+      <p:pic>
+        <p:nvPicPr>
+          <p:cNvPr id="177" name="Bud IPA logo.JPG" descr="Bud IPA logo.JPG"/>
+          <p:cNvPicPr>
+            <a:picLocks noChangeAspect="1"/>
+          </p:cNvPicPr>
+          <p:nvPr/>
+        </p:nvPicPr>
+        <p:blipFill>
+          <a:blip r:embed="rId2">
+            <a:extLst/>
+          </a:blip>
+          <a:stretch>
+            <a:fillRect/>
+          </a:stretch>
+        </p:blipFill>
+        <p:spPr>
+          <a:xfrm>
+            <a:off x="2949354" y="211144"/>
+            <a:ext cx="3245292" cy="2805106"/>
+          </a:xfrm>
+          <a:prstGeom prst="rect">
+            <a:avLst/>
+          </a:prstGeom>
+          <a:ln w="12700">
+            <a:miter lim="400000"/>
+          </a:ln>
+        </p:spPr>
+      </p:pic>
+    </p:spTree>
+  </p:cSld>
+  <p:clrMapOvr>
+    <a:masterClrMapping/>
+  </p:clrMapOvr>
+  <p:transition xmlns:p14="http://schemas.microsoft.com/office/powerpoint/2010/main" spd="med" advClick="1"/>
+</p:sld>
+</file>
+
+<file path=ppt/slides/slide13.xml><?xml version="1.0" encoding="utf-8"?>
+<p:sld xmlns:a="http://schemas.openxmlformats.org/drawingml/2006/main" xmlns:r="http://schemas.openxmlformats.org/officeDocument/2006/relationships" xmlns:p="http://schemas.openxmlformats.org/presentationml/2006/main" xmlns:m="http://schemas.openxmlformats.org/officeDocument/2006/math" xmlns:a14="http://schemas.microsoft.com/office/drawing/2010/main" showMasterSp="1" showMasterPhAnim="1">
+  <p:cSld>
+    <p:spTree>
+      <p:nvGrpSpPr>
+        <p:cNvPr id="1" name=""/>
+        <p:cNvGrpSpPr/>
+        <p:nvPr/>
+      </p:nvGrpSpPr>
+      <p:grpSpPr>
+        <a:xfrm>
+          <a:off x="0" y="0"/>
+          <a:ext cx="0" cy="0"/>
+          <a:chOff x="0" y="0"/>
+          <a:chExt cx="0" cy="0"/>
+        </a:xfrm>
+      </p:grpSpPr>
+      <p:sp>
+        <p:nvSpPr>
+          <p:cNvPr id="179" name="Recording available:…"/>
           <p:cNvSpPr txBox="1"/>
           <p:nvPr>
-            <p:ph type="title"/>
+            <p:ph type="subTitle" sz="quarter" idx="1"/>
           </p:nvPr>
         </p:nvSpPr>
         <p:spPr>
@@ -4130,6 +4278,26 @@
           <a:lstStyle/>
           <a:p>
             <a:pPr/>
+            <a:r>
+              <a:t>Recording available:</a:t>
+            </a:r>
+          </a:p>
+          <a:p>
+            <a:pPr/>
+            <a:r>
+              <a:rPr u="sng">
+                <a:solidFill>
+                  <a:srgbClr val="0000FF"/>
+                </a:solidFill>
+                <a:uFill>
+                  <a:solidFill>
+                    <a:srgbClr val="0000FF"/>
+                  </a:solidFill>
+                </a:uFill>
+                <a:hlinkClick r:id="rId2" invalidUrl="" action="" tgtFrame="" tooltip="" history="1" highlightClick="0" endSnd="0"/>
+              </a:rPr>
+              <a:t>https://youtu.be/Xiew0VW_CvI</a:t>
+            </a:r>
           </a:p>
         </p:txBody>
       </p:sp>
@@ -4161,7 +4329,7 @@
       </p:grpSpPr>
       <p:graphicFrame>
         <p:nvGraphicFramePr>
-          <p:cNvPr id="100" name="Table 3"/>
+          <p:cNvPr id="101" name="Table 3"/>
           <p:cNvGraphicFramePr/>
           <p:nvPr/>
         </p:nvGraphicFramePr>
@@ -10558,7 +10726,7 @@
       </p:graphicFrame>
       <p:sp>
         <p:nvSpPr>
-          <p:cNvPr id="101" name="TextBox 4"/>
+          <p:cNvPr id="102" name="TextBox 4"/>
           <p:cNvSpPr txBox="1"/>
           <p:nvPr/>
         </p:nvSpPr>
@@ -10598,7 +10766,7 @@
       </p:sp>
       <p:pic>
         <p:nvPicPr>
-          <p:cNvPr id="102" name="Screenshot 2020-03-07 15.20.48.png" descr="Screenshot 2020-03-07 15.20.48.png"/>
+          <p:cNvPr id="103" name="Screenshot 2020-03-07 15.20.48.png" descr="Screenshot 2020-03-07 15.20.48.png"/>
           <p:cNvPicPr>
             <a:picLocks noChangeAspect="1"/>
           </p:cNvPicPr>
@@ -10628,7 +10796,7 @@
       </p:pic>
       <p:sp>
         <p:nvSpPr>
-          <p:cNvPr id="103" name="Top 5: Colorado, California, Michigan, Oregon, and Texas"/>
+          <p:cNvPr id="104" name="Top 5: Colorado, California, Michigan, Oregon, and Texas"/>
           <p:cNvSpPr txBox="1"/>
           <p:nvPr/>
         </p:nvSpPr>
@@ -10664,7 +10832,7 @@
       </p:sp>
       <p:pic>
         <p:nvPicPr>
-          <p:cNvPr id="104" name="Picture 1" descr="Picture 1"/>
+          <p:cNvPr id="105" name="Picture 1" descr="Picture 1"/>
           <p:cNvPicPr>
             <a:picLocks noChangeAspect="1"/>
           </p:cNvPicPr>
@@ -10719,7 +10887,7 @@
       </p:grpSpPr>
       <p:sp>
         <p:nvSpPr>
-          <p:cNvPr id="108" name="TextBox 1"/>
+          <p:cNvPr id="109" name="TextBox 1"/>
           <p:cNvSpPr txBox="1"/>
           <p:nvPr/>
         </p:nvSpPr>
@@ -10759,7 +10927,7 @@
       </p:sp>
       <p:sp>
         <p:nvSpPr>
-          <p:cNvPr id="109" name="TextBox 2"/>
+          <p:cNvPr id="110" name="TextBox 2"/>
           <p:cNvSpPr txBox="1"/>
           <p:nvPr/>
         </p:nvSpPr>
@@ -10819,7 +10987,7 @@
       </p:sp>
       <p:pic>
         <p:nvPicPr>
-          <p:cNvPr id="110" name="Picture 2" descr="Picture 2"/>
+          <p:cNvPr id="111" name="Picture 2" descr="Picture 2"/>
           <p:cNvPicPr>
             <a:picLocks noChangeAspect="1"/>
           </p:cNvPicPr>
@@ -10848,7 +11016,7 @@
       </p:pic>
       <p:sp>
         <p:nvSpPr>
-          <p:cNvPr id="111" name="TextBox 4"/>
+          <p:cNvPr id="112" name="TextBox 4"/>
           <p:cNvSpPr txBox="1"/>
           <p:nvPr/>
         </p:nvSpPr>
@@ -10907,7 +11075,7 @@
       </p:sp>
       <p:pic>
         <p:nvPicPr>
-          <p:cNvPr id="112" name="Picture 1" descr="Picture 1"/>
+          <p:cNvPr id="113" name="Picture 1" descr="Picture 1"/>
           <p:cNvPicPr>
             <a:picLocks noChangeAspect="1"/>
           </p:cNvPicPr>
@@ -10936,7 +11104,7 @@
       </p:pic>
       <p:sp>
         <p:nvSpPr>
-          <p:cNvPr id="113" name="IBU Distributions by Beer Style"/>
+          <p:cNvPr id="114" name="IBU Distributions by Beer Style"/>
           <p:cNvSpPr txBox="1"/>
           <p:nvPr/>
         </p:nvSpPr>
@@ -11009,7 +11177,7 @@
                                       <p:cBhvr>
                                         <p:cTn id="6" fill="hold"/>
                                         <p:tgtEl>
-                                          <p:spTgt spid="109">
+                                          <p:spTgt spid="110">
                                             <p:txEl>
                                               <p:pRg st="1" end="1"/>
                                             </p:txEl>
@@ -11027,7 +11195,7 @@
                                       <p:cBhvr>
                                         <p:cTn id="7" dur="500"/>
                                         <p:tgtEl>
-                                          <p:spTgt spid="109">
+                                          <p:spTgt spid="110">
                                             <p:txEl>
                                               <p:pRg st="1" end="1"/>
                                             </p:txEl>
@@ -11060,7 +11228,7 @@
                                       <p:cBhvr>
                                         <p:cTn id="10" fill="hold"/>
                                         <p:tgtEl>
-                                          <p:spTgt spid="110"/>
+                                          <p:spTgt spid="111"/>
                                         </p:tgtEl>
                                         <p:attrNameLst>
                                           <p:attrName>style.visibility</p:attrName>
@@ -11074,7 +11242,7 @@
                                       <p:cBhvr>
                                         <p:cTn id="11" dur="500"/>
                                         <p:tgtEl>
-                                          <p:spTgt spid="110"/>
+                                          <p:spTgt spid="111"/>
                                         </p:tgtEl>
                                       </p:cBhvr>
                                     </p:animEffect>
@@ -11112,7 +11280,7 @@
                                       <p:cBhvr>
                                         <p:cTn id="15" fill="hold"/>
                                         <p:tgtEl>
-                                          <p:spTgt spid="109">
+                                          <p:spTgt spid="110">
                                             <p:txEl>
                                               <p:pRg st="2" end="2"/>
                                             </p:txEl>
@@ -11130,7 +11298,7 @@
                                       <p:cBhvr>
                                         <p:cTn id="16" dur="500"/>
                                         <p:tgtEl>
-                                          <p:spTgt spid="109">
+                                          <p:spTgt spid="110">
                                             <p:txEl>
                                               <p:pRg st="2" end="2"/>
                                             </p:txEl>
@@ -11163,7 +11331,7 @@
                                       <p:cBhvr>
                                         <p:cTn id="19" fill="hold"/>
                                         <p:tgtEl>
-                                          <p:spTgt spid="111">
+                                          <p:spTgt spid="112">
                                             <p:bg/>
                                           </p:spTgt>
                                         </p:tgtEl>
@@ -11179,7 +11347,7 @@
                                       <p:cBhvr>
                                         <p:cTn id="20" dur="500"/>
                                         <p:tgtEl>
-                                          <p:spTgt spid="111">
+                                          <p:spTgt spid="112">
                                             <p:bg/>
                                           </p:spTgt>
                                         </p:tgtEl>
@@ -11201,7 +11369,7 @@
                                       <p:cBhvr>
                                         <p:cTn id="22" fill="hold"/>
                                         <p:tgtEl>
-                                          <p:spTgt spid="111">
+                                          <p:spTgt spid="112">
                                             <p:txEl>
                                               <p:pRg st="0" end="0"/>
                                             </p:txEl>
@@ -11219,7 +11387,7 @@
                                       <p:cBhvr>
                                         <p:cTn id="23" dur="500"/>
                                         <p:tgtEl>
-                                          <p:spTgt spid="111">
+                                          <p:spTgt spid="112">
                                             <p:txEl>
                                               <p:pRg st="0" end="0"/>
                                             </p:txEl>
@@ -11252,7 +11420,7 @@
                                       <p:cBhvr>
                                         <p:cTn id="26" fill="hold"/>
                                         <p:tgtEl>
-                                          <p:spTgt spid="111">
+                                          <p:spTgt spid="112">
                                             <p:txEl>
                                               <p:pRg st="1" end="1"/>
                                             </p:txEl>
@@ -11270,7 +11438,7 @@
                                       <p:cBhvr>
                                         <p:cTn id="27" dur="500"/>
                                         <p:tgtEl>
-                                          <p:spTgt spid="111">
+                                          <p:spTgt spid="112">
                                             <p:txEl>
                                               <p:pRg st="1" end="1"/>
                                             </p:txEl>
@@ -11303,7 +11471,7 @@
                                       <p:cBhvr>
                                         <p:cTn id="30" fill="hold"/>
                                         <p:tgtEl>
-                                          <p:spTgt spid="111">
+                                          <p:spTgt spid="112">
                                             <p:txEl>
                                               <p:pRg st="2" end="2"/>
                                             </p:txEl>
@@ -11321,7 +11489,7 @@
                                       <p:cBhvr>
                                         <p:cTn id="31" dur="500"/>
                                         <p:tgtEl>
-                                          <p:spTgt spid="111">
+                                          <p:spTgt spid="112">
                                             <p:txEl>
                                               <p:pRg st="2" end="2"/>
                                             </p:txEl>
@@ -11360,9 +11528,9 @@
       </p:par>
     </p:tnLst>
     <p:bldLst>
-      <p:bldP build="p" bldLvl="5" animBg="1" rev="0" advAuto="0" spid="109" grpId="1"/>
-      <p:bldP build="p" bldLvl="5" animBg="1" rev="0" advAuto="0" spid="111" grpId="3"/>
-      <p:bldP build="whole" bldLvl="1" animBg="1" rev="0" advAuto="0" spid="110" grpId="2"/>
+      <p:bldP build="whole" bldLvl="1" animBg="1" rev="0" advAuto="0" spid="111" grpId="2"/>
+      <p:bldP build="p" bldLvl="5" animBg="1" rev="0" advAuto="0" spid="112" grpId="3"/>
+      <p:bldP build="p" bldLvl="5" animBg="1" rev="0" advAuto="0" spid="110" grpId="1"/>
     </p:bldLst>
   </p:timing>
 </p:sld>
@@ -11387,7 +11555,7 @@
       </p:grpSpPr>
       <p:pic>
         <p:nvPicPr>
-          <p:cNvPr id="117" name="Picture 1" descr="Picture 1"/>
+          <p:cNvPr id="118" name="Picture 1" descr="Picture 1"/>
           <p:cNvPicPr>
             <a:picLocks noChangeAspect="1"/>
           </p:cNvPicPr>
@@ -11416,7 +11584,7 @@
       </p:pic>
       <p:pic>
         <p:nvPicPr>
-          <p:cNvPr id="118" name="Picture 2" descr="Picture 2"/>
+          <p:cNvPr id="119" name="Picture 2" descr="Picture 2"/>
           <p:cNvPicPr>
             <a:picLocks noChangeAspect="1"/>
           </p:cNvPicPr>
@@ -11445,7 +11613,7 @@
       </p:pic>
       <p:sp>
         <p:nvSpPr>
-          <p:cNvPr id="119" name="TextBox 1"/>
+          <p:cNvPr id="120" name="TextBox 1"/>
           <p:cNvSpPr txBox="1"/>
           <p:nvPr/>
         </p:nvSpPr>
@@ -11485,7 +11653,7 @@
       </p:sp>
       <p:pic>
         <p:nvPicPr>
-          <p:cNvPr id="120" name="Picture 1" descr="Picture 1"/>
+          <p:cNvPr id="121" name="Picture 1" descr="Picture 1"/>
           <p:cNvPicPr>
             <a:picLocks noChangeAspect="1"/>
           </p:cNvPicPr>
@@ -11551,7 +11719,7 @@
                                       <p:cBhvr>
                                         <p:cTn id="6" fill="hold"/>
                                         <p:tgtEl>
-                                          <p:spTgt spid="117"/>
+                                          <p:spTgt spid="118"/>
                                         </p:tgtEl>
                                         <p:attrNameLst>
                                           <p:attrName>style.visibility</p:attrName>
@@ -11565,7 +11733,7 @@
                                       <p:cBhvr>
                                         <p:cTn id="7" dur="500"/>
                                         <p:tgtEl>
-                                          <p:spTgt spid="117"/>
+                                          <p:spTgt spid="118"/>
                                         </p:tgtEl>
                                       </p:cBhvr>
                                     </p:animEffect>
@@ -11600,7 +11768,7 @@
       </p:par>
     </p:tnLst>
     <p:bldLst>
-      <p:bldP build="whole" bldLvl="1" animBg="1" rev="0" advAuto="0" spid="117" grpId="1"/>
+      <p:bldP build="whole" bldLvl="1" animBg="1" rev="0" advAuto="0" spid="118" grpId="1"/>
     </p:bldLst>
   </p:timing>
 </p:sld>
@@ -11651,7 +11819,7 @@
       </p:grpSpPr>
       <p:sp>
         <p:nvSpPr>
-          <p:cNvPr id="122" name="TextBox 1"/>
+          <p:cNvPr id="123" name="TextBox 1"/>
           <p:cNvSpPr txBox="1"/>
           <p:nvPr/>
         </p:nvSpPr>
@@ -11691,7 +11859,7 @@
       </p:sp>
       <p:graphicFrame>
         <p:nvGraphicFramePr>
-          <p:cNvPr id="123" name="Table 5"/>
+          <p:cNvPr id="124" name="Table 5"/>
           <p:cNvGraphicFramePr/>
           <p:nvPr/>
         </p:nvGraphicFramePr>
@@ -19475,7 +19643,7 @@
       </p:graphicFrame>
       <p:pic>
         <p:nvPicPr>
-          <p:cNvPr id="124" name="Screenshot 2020-03-07 15.22.47.png" descr="Screenshot 2020-03-07 15.22.47.png"/>
+          <p:cNvPr id="125" name="Screenshot 2020-03-07 15.22.47.png" descr="Screenshot 2020-03-07 15.22.47.png"/>
           <p:cNvPicPr>
             <a:picLocks noChangeAspect="1"/>
           </p:cNvPicPr>
@@ -19505,7 +19673,7 @@
       </p:pic>
       <p:pic>
         <p:nvPicPr>
-          <p:cNvPr id="125" name="Screenshot 2020-03-07 15.22.19.png" descr="Screenshot 2020-03-07 15.22.19.png"/>
+          <p:cNvPr id="126" name="Screenshot 2020-03-07 15.22.19.png" descr="Screenshot 2020-03-07 15.22.19.png"/>
           <p:cNvPicPr>
             <a:picLocks noChangeAspect="1"/>
           </p:cNvPicPr>
@@ -19535,7 +19703,7 @@
       </p:pic>
       <p:pic>
         <p:nvPicPr>
-          <p:cNvPr id="126" name="Picture 1" descr="Picture 1"/>
+          <p:cNvPr id="127" name="Picture 1" descr="Picture 1"/>
           <p:cNvPicPr>
             <a:picLocks noChangeAspect="1"/>
           </p:cNvPicPr>
@@ -19601,7 +19769,7 @@
                                       <p:cBhvr>
                                         <p:cTn id="6" fill="hold"/>
                                         <p:tgtEl>
-                                          <p:spTgt spid="125"/>
+                                          <p:spTgt spid="126"/>
                                         </p:tgtEl>
                                         <p:attrNameLst>
                                           <p:attrName>style.visibility</p:attrName>
@@ -19615,7 +19783,7 @@
                                       <p:cBhvr>
                                         <p:cTn id="7" dur="500"/>
                                         <p:tgtEl>
-                                          <p:spTgt spid="125"/>
+                                          <p:spTgt spid="126"/>
                                         </p:tgtEl>
                                       </p:cBhvr>
                                     </p:animEffect>
@@ -19644,7 +19812,7 @@
                                       <p:cBhvr>
                                         <p:cTn id="10" fill="hold"/>
                                         <p:tgtEl>
-                                          <p:spTgt spid="123"/>
+                                          <p:spTgt spid="124"/>
                                         </p:tgtEl>
                                         <p:attrNameLst>
                                           <p:attrName>style.visibility</p:attrName>
@@ -19658,7 +19826,7 @@
                                       <p:cBhvr>
                                         <p:cTn id="11" dur="500"/>
                                         <p:tgtEl>
-                                          <p:spTgt spid="123"/>
+                                          <p:spTgt spid="124"/>
                                         </p:tgtEl>
                                       </p:cBhvr>
                                     </p:animEffect>
@@ -19693,8 +19861,8 @@
       </p:par>
     </p:tnLst>
     <p:bldLst>
-      <p:bldP build="whole" bldLvl="1" animBg="1" rev="0" advAuto="0" spid="123" grpId="2"/>
-      <p:bldP build="whole" bldLvl="1" animBg="1" rev="0" advAuto="0" spid="125" grpId="1"/>
+      <p:bldP build="whole" bldLvl="1" animBg="1" rev="0" advAuto="0" spid="124" grpId="2"/>
+      <p:bldP build="whole" bldLvl="1" animBg="1" rev="0" advAuto="0" spid="126" grpId="1"/>
     </p:bldLst>
   </p:timing>
 </p:sld>
@@ -19719,7 +19887,7 @@
       </p:grpSpPr>
       <p:sp>
         <p:nvSpPr>
-          <p:cNvPr id="128" name="TextBox 2"/>
+          <p:cNvPr id="129" name="TextBox 2"/>
           <p:cNvSpPr txBox="1"/>
           <p:nvPr/>
         </p:nvSpPr>
@@ -19759,7 +19927,7 @@
       </p:sp>
       <p:sp>
         <p:nvSpPr>
-          <p:cNvPr id="129" name="TextBox 3"/>
+          <p:cNvPr id="130" name="TextBox 3"/>
           <p:cNvSpPr txBox="1"/>
           <p:nvPr/>
         </p:nvSpPr>
@@ -19917,7 +20085,7 @@
                 <a:cs typeface="+mj-cs"/>
                 <a:sym typeface="Helvetica"/>
               </a:rPr>
-              <a:t>Lee Hill Series Vol. 5 Belgian Quadrupel Ale</a:t>
+              <a:t>Lee Hill Series Vol. 5 Belgian Quadrupel Ale -12.8%</a:t>
             </a:r>
             <a:r>
               <a:t>)</a:t>
@@ -19971,7 +20139,7 @@
                 <a:cs typeface="+mj-cs"/>
                 <a:sym typeface="Helvetica"/>
               </a:rPr>
-              <a:t>Bitter Bitch Imperial IPA</a:t>
+              <a:t>Bitter Bitch Imperial IPA - 138</a:t>
             </a:r>
             <a:r>
               <a:t>)</a:t>
@@ -19981,7 +20149,7 @@
       </p:sp>
       <p:pic>
         <p:nvPicPr>
-          <p:cNvPr id="130" name="Picture 2" descr="Picture 2"/>
+          <p:cNvPr id="131" name="Picture 2" descr="Picture 2"/>
           <p:cNvPicPr>
             <a:picLocks noChangeAspect="1"/>
           </p:cNvPicPr>
@@ -20010,7 +20178,7 @@
       </p:pic>
       <p:pic>
         <p:nvPicPr>
-          <p:cNvPr id="131" name="Picture 4" descr="Picture 4"/>
+          <p:cNvPr id="132" name="Picture 4" descr="Picture 4"/>
           <p:cNvPicPr>
             <a:picLocks noChangeAspect="1"/>
           </p:cNvPicPr>
@@ -20039,7 +20207,7 @@
       </p:pic>
       <p:pic>
         <p:nvPicPr>
-          <p:cNvPr id="132" name="Picture 1" descr="Picture 1"/>
+          <p:cNvPr id="133" name="Picture 1" descr="Picture 1"/>
           <p:cNvPicPr>
             <a:picLocks noChangeAspect="1"/>
           </p:cNvPicPr>
@@ -20105,7 +20273,7 @@
                                       <p:cBhvr>
                                         <p:cTn id="6" fill="hold"/>
                                         <p:tgtEl>
-                                          <p:spTgt spid="129">
+                                          <p:spTgt spid="130">
                                             <p:bg/>
                                           </p:spTgt>
                                         </p:tgtEl>
@@ -20121,7 +20289,7 @@
                                       <p:cBhvr>
                                         <p:cTn id="7" dur="500"/>
                                         <p:tgtEl>
-                                          <p:spTgt spid="129">
+                                          <p:spTgt spid="130">
                                             <p:bg/>
                                           </p:spTgt>
                                         </p:tgtEl>
@@ -20143,7 +20311,7 @@
                                       <p:cBhvr>
                                         <p:cTn id="9" fill="hold"/>
                                         <p:tgtEl>
-                                          <p:spTgt spid="129">
+                                          <p:spTgt spid="130">
                                             <p:txEl>
                                               <p:pRg st="0" end="0"/>
                                             </p:txEl>
@@ -20161,7 +20329,7 @@
                                       <p:cBhvr>
                                         <p:cTn id="10" dur="500"/>
                                         <p:tgtEl>
-                                          <p:spTgt spid="129">
+                                          <p:spTgt spid="130">
                                             <p:txEl>
                                               <p:pRg st="0" end="0"/>
                                             </p:txEl>
@@ -20194,7 +20362,7 @@
                                       <p:cBhvr>
                                         <p:cTn id="13" fill="hold"/>
                                         <p:tgtEl>
-                                          <p:spTgt spid="129">
+                                          <p:spTgt spid="130">
                                             <p:txEl>
                                               <p:pRg st="1" end="1"/>
                                             </p:txEl>
@@ -20212,7 +20380,7 @@
                                       <p:cBhvr>
                                         <p:cTn id="14" dur="500"/>
                                         <p:tgtEl>
-                                          <p:spTgt spid="129">
+                                          <p:spTgt spid="130">
                                             <p:txEl>
                                               <p:pRg st="1" end="1"/>
                                             </p:txEl>
@@ -20245,7 +20413,7 @@
                                       <p:cBhvr>
                                         <p:cTn id="17" fill="hold"/>
                                         <p:tgtEl>
-                                          <p:spTgt spid="129">
+                                          <p:spTgt spid="130">
                                             <p:txEl>
                                               <p:pRg st="2" end="2"/>
                                             </p:txEl>
@@ -20263,7 +20431,7 @@
                                       <p:cBhvr>
                                         <p:cTn id="18" dur="500"/>
                                         <p:tgtEl>
-                                          <p:spTgt spid="129">
+                                          <p:spTgt spid="130">
                                             <p:txEl>
                                               <p:pRg st="2" end="2"/>
                                             </p:txEl>
@@ -20305,7 +20473,7 @@
                                       <p:cBhvr>
                                         <p:cTn id="22" fill="hold"/>
                                         <p:tgtEl>
-                                          <p:spTgt spid="129">
+                                          <p:spTgt spid="130">
                                             <p:txEl>
                                               <p:pRg st="3" end="3"/>
                                             </p:txEl>
@@ -20323,7 +20491,7 @@
                                       <p:cBhvr>
                                         <p:cTn id="23" dur="500"/>
                                         <p:tgtEl>
-                                          <p:spTgt spid="129">
+                                          <p:spTgt spid="130">
                                             <p:txEl>
                                               <p:pRg st="3" end="3"/>
                                             </p:txEl>
@@ -20356,7 +20524,7 @@
                                       <p:cBhvr>
                                         <p:cTn id="26" fill="hold"/>
                                         <p:tgtEl>
-                                          <p:spTgt spid="129">
+                                          <p:spTgt spid="130">
                                             <p:txEl>
                                               <p:pRg st="4" end="4"/>
                                             </p:txEl>
@@ -20374,7 +20542,7 @@
                                       <p:cBhvr>
                                         <p:cTn id="27" dur="500"/>
                                         <p:tgtEl>
-                                          <p:spTgt spid="129">
+                                          <p:spTgt spid="130">
                                             <p:txEl>
                                               <p:pRg st="4" end="4"/>
                                             </p:txEl>
@@ -20407,7 +20575,7 @@
                                       <p:cBhvr>
                                         <p:cTn id="30" fill="hold"/>
                                         <p:tgtEl>
-                                          <p:spTgt spid="129">
+                                          <p:spTgt spid="130">
                                             <p:txEl>
                                               <p:pRg st="5" end="5"/>
                                             </p:txEl>
@@ -20425,7 +20593,7 @@
                                       <p:cBhvr>
                                         <p:cTn id="31" dur="500"/>
                                         <p:tgtEl>
-                                          <p:spTgt spid="129">
+                                          <p:spTgt spid="130">
                                             <p:txEl>
                                               <p:pRg st="5" end="5"/>
                                             </p:txEl>
@@ -20467,7 +20635,7 @@
                                       <p:cBhvr>
                                         <p:cTn id="35" fill="hold"/>
                                         <p:tgtEl>
-                                          <p:spTgt spid="129">
+                                          <p:spTgt spid="130">
                                             <p:txEl>
                                               <p:pRg st="6" end="6"/>
                                             </p:txEl>
@@ -20485,7 +20653,7 @@
                                       <p:cBhvr>
                                         <p:cTn id="36" dur="500"/>
                                         <p:tgtEl>
-                                          <p:spTgt spid="129">
+                                          <p:spTgt spid="130">
                                             <p:txEl>
                                               <p:pRg st="6" end="6"/>
                                             </p:txEl>
@@ -20518,7 +20686,7 @@
                                       <p:cBhvr>
                                         <p:cTn id="39" fill="hold"/>
                                         <p:tgtEl>
-                                          <p:spTgt spid="129">
+                                          <p:spTgt spid="130">
                                             <p:txEl>
                                               <p:pRg st="7" end="7"/>
                                             </p:txEl>
@@ -20536,7 +20704,7 @@
                                       <p:cBhvr>
                                         <p:cTn id="40" dur="500"/>
                                         <p:tgtEl>
-                                          <p:spTgt spid="129">
+                                          <p:spTgt spid="130">
                                             <p:txEl>
                                               <p:pRg st="7" end="7"/>
                                             </p:txEl>
@@ -20569,7 +20737,7 @@
                                       <p:cBhvr>
                                         <p:cTn id="43" fill="hold"/>
                                         <p:tgtEl>
-                                          <p:spTgt spid="130"/>
+                                          <p:spTgt spid="131"/>
                                         </p:tgtEl>
                                         <p:attrNameLst>
                                           <p:attrName>style.visibility</p:attrName>
@@ -20583,7 +20751,7 @@
                                       <p:cBhvr>
                                         <p:cTn id="44" dur="500"/>
                                         <p:tgtEl>
-                                          <p:spTgt spid="130"/>
+                                          <p:spTgt spid="131"/>
                                         </p:tgtEl>
                                       </p:cBhvr>
                                     </p:animEffect>
@@ -20612,7 +20780,7 @@
                                       <p:cBhvr>
                                         <p:cTn id="47" fill="hold"/>
                                         <p:tgtEl>
-                                          <p:spTgt spid="129">
+                                          <p:spTgt spid="130">
                                             <p:txEl>
                                               <p:pRg st="8" end="8"/>
                                             </p:txEl>
@@ -20630,7 +20798,7 @@
                                       <p:cBhvr>
                                         <p:cTn id="48" dur="500"/>
                                         <p:tgtEl>
-                                          <p:spTgt spid="129">
+                                          <p:spTgt spid="130">
                                             <p:txEl>
                                               <p:pRg st="8" end="8"/>
                                             </p:txEl>
@@ -20672,7 +20840,7 @@
                                       <p:cBhvr>
                                         <p:cTn id="52" fill="hold"/>
                                         <p:tgtEl>
-                                          <p:spTgt spid="129">
+                                          <p:spTgt spid="130">
                                             <p:txEl>
                                               <p:pRg st="9" end="9"/>
                                             </p:txEl>
@@ -20690,7 +20858,7 @@
                                       <p:cBhvr>
                                         <p:cTn id="53" dur="500"/>
                                         <p:tgtEl>
-                                          <p:spTgt spid="129">
+                                          <p:spTgt spid="130">
                                             <p:txEl>
                                               <p:pRg st="9" end="9"/>
                                             </p:txEl>
@@ -20723,7 +20891,7 @@
                                       <p:cBhvr>
                                         <p:cTn id="56" fill="hold"/>
                                         <p:tgtEl>
-                                          <p:spTgt spid="129">
+                                          <p:spTgt spid="130">
                                             <p:txEl>
                                               <p:pRg st="10" end="10"/>
                                             </p:txEl>
@@ -20741,7 +20909,7 @@
                                       <p:cBhvr>
                                         <p:cTn id="57" dur="500"/>
                                         <p:tgtEl>
-                                          <p:spTgt spid="129">
+                                          <p:spTgt spid="130">
                                             <p:txEl>
                                               <p:pRg st="10" end="10"/>
                                             </p:txEl>
@@ -20774,7 +20942,7 @@
                                       <p:cBhvr>
                                         <p:cTn id="60" fill="hold"/>
                                         <p:tgtEl>
-                                          <p:spTgt spid="131"/>
+                                          <p:spTgt spid="132"/>
                                         </p:tgtEl>
                                         <p:attrNameLst>
                                           <p:attrName>style.visibility</p:attrName>
@@ -20788,7 +20956,7 @@
                                       <p:cBhvr>
                                         <p:cTn id="61" dur="500"/>
                                         <p:tgtEl>
-                                          <p:spTgt spid="131"/>
+                                          <p:spTgt spid="132"/>
                                         </p:tgtEl>
                                       </p:cBhvr>
                                     </p:animEffect>
@@ -20823,9 +20991,9 @@
       </p:par>
     </p:tnLst>
     <p:bldLst>
-      <p:bldP build="p" bldLvl="5" animBg="1" rev="0" advAuto="0" spid="129" grpId="1"/>
-      <p:bldP build="whole" bldLvl="1" animBg="1" rev="0" advAuto="0" spid="130" grpId="2"/>
-      <p:bldP build="whole" bldLvl="1" animBg="1" rev="0" advAuto="0" spid="131" grpId="3"/>
+      <p:bldP build="p" bldLvl="5" animBg="1" rev="0" advAuto="0" spid="130" grpId="1"/>
+      <p:bldP build="whole" bldLvl="1" animBg="1" rev="0" advAuto="0" spid="131" grpId="2"/>
+      <p:bldP build="whole" bldLvl="1" animBg="1" rev="0" advAuto="0" spid="132" grpId="3"/>
     </p:bldLst>
   </p:timing>
 </p:sld>
@@ -20850,7 +21018,7 @@
       </p:grpSpPr>
       <p:sp>
         <p:nvSpPr>
-          <p:cNvPr id="136" name="TextBox 3"/>
+          <p:cNvPr id="137" name="TextBox 3"/>
           <p:cNvSpPr txBox="1"/>
           <p:nvPr/>
         </p:nvSpPr>
@@ -20894,7 +21062,7 @@
       </p:sp>
       <p:graphicFrame>
         <p:nvGraphicFramePr>
-          <p:cNvPr id="137" name="Table 5"/>
+          <p:cNvPr id="138" name="Table 5"/>
           <p:cNvGraphicFramePr/>
           <p:nvPr/>
         </p:nvGraphicFramePr>
@@ -21503,7 +21671,7 @@
       </p:graphicFrame>
       <p:pic>
         <p:nvPicPr>
-          <p:cNvPr id="138" name="Picture 1" descr="Picture 1"/>
+          <p:cNvPr id="139" name="Picture 1" descr="Picture 1"/>
           <p:cNvPicPr>
             <a:picLocks noChangeAspect="1"/>
           </p:cNvPicPr>
@@ -21532,7 +21700,7 @@
       </p:pic>
       <p:pic>
         <p:nvPicPr>
-          <p:cNvPr id="139" name="Picture 2" descr="Picture 2"/>
+          <p:cNvPr id="140" name="Picture 2" descr="Picture 2"/>
           <p:cNvPicPr>
             <a:picLocks noChangeAspect="1"/>
           </p:cNvPicPr>
@@ -21561,7 +21729,7 @@
       </p:pic>
       <p:sp>
         <p:nvSpPr>
-          <p:cNvPr id="140" name="Straight Arrow Connector 10"/>
+          <p:cNvPr id="141" name="Straight Arrow Connector 10"/>
           <p:cNvSpPr/>
           <p:nvPr/>
         </p:nvSpPr>
@@ -21597,7 +21765,7 @@
       </p:sp>
       <p:sp>
         <p:nvSpPr>
-          <p:cNvPr id="141" name="Straight Arrow Connector 13"/>
+          <p:cNvPr id="142" name="Straight Arrow Connector 13"/>
           <p:cNvSpPr/>
           <p:nvPr/>
         </p:nvSpPr>
@@ -21633,7 +21801,7 @@
       </p:sp>
       <p:sp>
         <p:nvSpPr>
-          <p:cNvPr id="142" name="Straight Arrow Connector 14"/>
+          <p:cNvPr id="143" name="Straight Arrow Connector 14"/>
           <p:cNvSpPr/>
           <p:nvPr/>
         </p:nvSpPr>
@@ -21695,7 +21863,7 @@
       </p:grpSpPr>
       <p:sp>
         <p:nvSpPr>
-          <p:cNvPr id="146" name="TextBox 2"/>
+          <p:cNvPr id="147" name="TextBox 2"/>
           <p:cNvSpPr txBox="1"/>
           <p:nvPr/>
         </p:nvSpPr>
@@ -21739,7 +21907,7 @@
       </p:sp>
       <p:pic>
         <p:nvPicPr>
-          <p:cNvPr id="147" name="Picture 1" descr="Picture 1"/>
+          <p:cNvPr id="148" name="Picture 1" descr="Picture 1"/>
           <p:cNvPicPr>
             <a:picLocks noChangeAspect="1"/>
           </p:cNvPicPr>
@@ -21768,7 +21936,7 @@
       </p:pic>
       <p:sp>
         <p:nvSpPr>
-          <p:cNvPr id="148" name="TextBox 3"/>
+          <p:cNvPr id="149" name="TextBox 3"/>
           <p:cNvSpPr txBox="1"/>
           <p:nvPr/>
         </p:nvSpPr>
@@ -21813,7 +21981,7 @@
       </p:sp>
       <p:sp>
         <p:nvSpPr>
-          <p:cNvPr id="149" name="TextBox 6"/>
+          <p:cNvPr id="150" name="TextBox 6"/>
           <p:cNvSpPr txBox="1"/>
           <p:nvPr/>
         </p:nvSpPr>
@@ -21858,7 +22026,7 @@
       </p:sp>
       <p:pic>
         <p:nvPicPr>
-          <p:cNvPr id="150" name="Picture 1" descr="Picture 1"/>
+          <p:cNvPr id="151" name="Picture 1" descr="Picture 1"/>
           <p:cNvPicPr>
             <a:picLocks noChangeAspect="1"/>
           </p:cNvPicPr>
@@ -21920,7 +22088,7 @@
       </p:grpSpPr>
       <p:sp>
         <p:nvSpPr>
-          <p:cNvPr id="154" name="IPAs vs Non-IPA Ales"/>
+          <p:cNvPr id="155" name="IPAs vs Non-IPA Ales"/>
           <p:cNvSpPr txBox="1"/>
           <p:nvPr>
             <p:ph type="title"/>
@@ -21944,13 +22112,13 @@
       </p:sp>
       <p:grpSp>
         <p:nvGrpSpPr>
-          <p:cNvPr id="157" name="Image Gallery"/>
+          <p:cNvPr id="158" name="Image Gallery"/>
           <p:cNvGrpSpPr/>
           <p:nvPr/>
         </p:nvGrpSpPr>
         <p:grpSpPr>
           <a:xfrm>
-            <a:off x="409004" y="3812111"/>
+            <a:off x="383604" y="3253311"/>
             <a:ext cx="4109592" cy="3045795"/>
             <a:chOff x="0" y="78510"/>
             <a:chExt cx="4109591" cy="3045793"/>
@@ -21958,7 +22126,7 @@
         </p:grpSpPr>
         <p:pic>
           <p:nvPicPr>
-            <p:cNvPr id="155" name="Screen Shot 2020-03-07 at 5.00.52 PM.png" descr="Screen Shot 2020-03-07 at 5.00.52 PM.png"/>
+            <p:cNvPr id="156" name="Screen Shot 2020-03-07 at 5.00.52 PM.png" descr="Screen Shot 2020-03-07 at 5.00.52 PM.png"/>
             <p:cNvPicPr>
               <a:picLocks noChangeAspect="1"/>
             </p:cNvPicPr>
@@ -21990,7 +22158,7 @@
         </p:pic>
         <p:sp>
           <p:nvSpPr>
-            <p:cNvPr id="156" name="Type to enter a caption."/>
+            <p:cNvPr id="157" name="Type to enter a caption."/>
             <p:cNvSpPr/>
             <p:nvPr/>
           </p:nvSpPr>
@@ -22038,13 +22206,13 @@
       </p:grpSp>
       <p:grpSp>
         <p:nvGrpSpPr>
-          <p:cNvPr id="160" name="Image Gallery"/>
+          <p:cNvPr id="161" name="Image Gallery"/>
           <p:cNvGrpSpPr/>
           <p:nvPr/>
         </p:nvGrpSpPr>
         <p:grpSpPr>
           <a:xfrm>
-            <a:off x="4606577" y="3898257"/>
+            <a:off x="4593877" y="3314057"/>
             <a:ext cx="4223446" cy="2972793"/>
             <a:chOff x="0" y="0"/>
             <a:chExt cx="4223444" cy="2972792"/>
@@ -22052,7 +22220,7 @@
         </p:grpSpPr>
         <p:pic>
           <p:nvPicPr>
-            <p:cNvPr id="158" name="Screen Shot 2020-03-07 at 4.38.14 PM.png" descr="Screen Shot 2020-03-07 at 4.38.14 PM.png"/>
+            <p:cNvPr id="159" name="Screen Shot 2020-03-07 at 4.38.14 PM.png" descr="Screen Shot 2020-03-07 at 4.38.14 PM.png"/>
             <p:cNvPicPr>
               <a:picLocks noChangeAspect="1"/>
             </p:cNvPicPr>
@@ -22084,7 +22252,7 @@
         </p:pic>
         <p:sp>
           <p:nvSpPr>
-            <p:cNvPr id="159" name="Type to enter a caption."/>
+            <p:cNvPr id="160" name="Type to enter a caption."/>
             <p:cNvSpPr/>
             <p:nvPr/>
           </p:nvSpPr>
@@ -22132,7 +22300,7 @@
       </p:grpSp>
       <p:sp>
         <p:nvSpPr>
-          <p:cNvPr id="161" name="Seeing the grouping of IPA and Non-IPA charted, a KNN model seemed appropriate for predicting beer style…"/>
+          <p:cNvPr id="162" name="Seeing the grouping of IPA and Non-IPA charted, a KNN model seemed appropriate for predicting beer style…"/>
           <p:cNvSpPr txBox="1"/>
           <p:nvPr/>
         </p:nvSpPr>

</xml_diff>